<commit_message>
Distance for loop complete
</commit_message>
<xml_diff>
--- a/BC repo/Polar Bear Tracking.pptx
+++ b/BC repo/Polar Bear Tracking.pptx
@@ -5,10 +5,10 @@
     <p:sldMasterId id="2147483648" r:id="rId4"/>
   </p:sldMasterIdLst>
   <p:notesMasterIdLst>
-    <p:notesMasterId r:id="rId16"/>
+    <p:notesMasterId r:id="rId15"/>
   </p:notesMasterIdLst>
   <p:handoutMasterIdLst>
-    <p:handoutMasterId r:id="rId17"/>
+    <p:handoutMasterId r:id="rId16"/>
   </p:handoutMasterIdLst>
   <p:sldIdLst>
     <p:sldId id="282" r:id="rId5"/>
@@ -21,7 +21,6 @@
     <p:sldId id="295" r:id="rId12"/>
     <p:sldId id="285" r:id="rId13"/>
     <p:sldId id="296" r:id="rId14"/>
-    <p:sldId id="256" r:id="rId15"/>
   </p:sldIdLst>
   <p:sldSz cx="12192000" cy="6858000"/>
   <p:notesSz cx="6858000" cy="9144000"/>
@@ -3118,7 +3117,7 @@
           <a:p>
             <a:fld id="{EF1077DB-935E-4A0A-947A-D283B9F9F452}" type="datetimeFigureOut">
               <a:rPr lang="en-US" smtClean="0"/>
-              <a:t>10/13/2020</a:t>
+              <a:t>10/21/2020</a:t>
             </a:fld>
             <a:endParaRPr lang="en-US"/>
           </a:p>
@@ -3295,7 +3294,7 @@
           <a:p>
             <a:fld id="{2D9EC30E-1A71-4188-9BE7-E2A64929A436}" type="datetimeFigureOut">
               <a:rPr lang="en-US" noProof="0" smtClean="0"/>
-              <a:t>10/13/2020</a:t>
+              <a:t>10/21/2020</a:t>
             </a:fld>
             <a:endParaRPr lang="en-US" noProof="0"/>
           </a:p>
@@ -12216,7 +12215,7 @@
         </p:blipFill>
         <p:spPr>
           <a:xfrm>
-            <a:off x="144000" y="146383"/>
+            <a:off x="143400" y="146383"/>
             <a:ext cx="11905200" cy="6565233"/>
           </a:xfrm>
         </p:spPr>
@@ -12237,14 +12236,19 @@
             <p:ph type="ctrTitle"/>
           </p:nvPr>
         </p:nvSpPr>
-        <p:spPr/>
+        <p:spPr>
+          <a:xfrm>
+            <a:off x="360000" y="359999"/>
+            <a:ext cx="4416588" cy="4167613"/>
+          </a:xfrm>
+        </p:spPr>
         <p:txBody>
           <a:bodyPr/>
           <a:lstStyle/>
           <a:p>
             <a:r>
-              <a:rPr lang="en-US" dirty="0"/>
-              <a:t>Presentation Cover Title</a:t>
+              <a:rPr lang="en-US" sz="5400" dirty="0"/>
+              <a:t>Polar Bear Tracking</a:t>
             </a:r>
           </a:p>
         </p:txBody>
@@ -12266,6 +12270,10 @@
           </p:nvPr>
         </p:nvSpPr>
         <p:spPr>
+          <a:xfrm>
+            <a:off x="359999" y="5131294"/>
+            <a:ext cx="4416587" cy="1366708"/>
+          </a:xfrm>
           <a:ln>
             <a:gradFill>
               <a:gsLst>
@@ -12285,9 +12293,45 @@
           <a:bodyPr/>
           <a:lstStyle/>
           <a:p>
+            <a:pPr algn="ctr"/>
+            <a:r>
+              <a:rPr lang="en-US" b="1" u="sng" dirty="0"/>
+              <a:t>Project 2 Teammates</a:t>
+            </a:r>
             <a:r>
               <a:rPr lang="en-US" dirty="0"/>
-              <a:t>Lorem ipsum dolor sit amet, consectetur adipiscing elit.</a:t>
+              <a:t>:</a:t>
+            </a:r>
+          </a:p>
+          <a:p>
+            <a:pPr algn="l"/>
+            <a:r>
+              <a:rPr lang="en-US" dirty="0"/>
+              <a:t>	Meg </a:t>
+            </a:r>
+            <a:r>
+              <a:rPr lang="en-US" dirty="0" err="1"/>
+              <a:t>Estey</a:t>
+            </a:r>
+            <a:r>
+              <a:rPr lang="en-US" dirty="0"/>
+              <a:t>, Curtis </a:t>
+            </a:r>
+            <a:r>
+              <a:rPr lang="en-US" dirty="0" err="1"/>
+              <a:t>Caile</a:t>
+            </a:r>
+            <a:r>
+              <a:rPr lang="en-US" dirty="0"/>
+              <a:t>, Chris 	</a:t>
+            </a:r>
+            <a:r>
+              <a:rPr lang="en-US" dirty="0" err="1"/>
+              <a:t>Joncha</a:t>
+            </a:r>
+            <a:r>
+              <a:rPr lang="en-US" dirty="0"/>
+              <a:t>, Dave Borowski and Brooke 	Crofts</a:t>
             </a:r>
           </a:p>
         </p:txBody>
@@ -12373,8 +12417,24 @@
           <a:lstStyle/>
           <a:p>
             <a:r>
+              <a:rPr lang="en-US" sz="3200" dirty="0">
+                <a:latin typeface="Ravie" panose="04040805050809020602" pitchFamily="82" charset="0"/>
+              </a:rPr>
+              <a:t>Our Thanks To:</a:t>
+            </a:r>
+            <a:br>
               <a:rPr lang="en-US" dirty="0"/>
-              <a:t>Thank You</a:t>
+            </a:br>
+            <a:br>
+              <a:rPr lang="en-US" dirty="0"/>
+            </a:br>
+            <a:r>
+              <a:rPr lang="en-US" dirty="0"/>
+              <a:t> </a:t>
+            </a:r>
+            <a:r>
+              <a:rPr lang="en-US" sz="3200" dirty="0"/>
+              <a:t>Kevin, Jess, and Royal</a:t>
             </a:r>
           </a:p>
         </p:txBody>
@@ -12402,50 +12462,11 @@
           <a:p>
             <a:r>
               <a:rPr lang="en-US" dirty="0"/>
-              <a:t>April Hansson</a:t>
+              <a:t>Project 2 – Polar Bear Habitat </a:t>
             </a:r>
           </a:p>
         </p:txBody>
       </p:sp>
-      <p:pic>
-        <p:nvPicPr>
-          <p:cNvPr id="8" name="Graphic 7" descr="User" title="Icon - Presenter Name">
-            <a:extLst>
-              <a:ext uri="{FF2B5EF4-FFF2-40B4-BE49-F238E27FC236}">
-                <a16:creationId xmlns:a16="http://schemas.microsoft.com/office/drawing/2014/main" id="{111541C4-DB03-4E53-994D-499C7D73C4DF}"/>
-              </a:ext>
-            </a:extLst>
-          </p:cNvPr>
-          <p:cNvPicPr>
-            <a:picLocks noChangeAspect="1"/>
-          </p:cNvPicPr>
-          <p:nvPr/>
-        </p:nvPicPr>
-        <p:blipFill>
-          <a:blip r:embed="rId3" cstate="screen">
-            <a:extLst>
-              <a:ext uri="{28A0092B-C50C-407E-A947-70E740481C1C}">
-                <a14:useLocalDpi xmlns:a14="http://schemas.microsoft.com/office/drawing/2010/main"/>
-              </a:ext>
-              <a:ext uri="{96DAC541-7B7A-43D3-8B79-37D633B846F1}">
-                <asvg:svgBlip xmlns:asvg="http://schemas.microsoft.com/office/drawing/2016/SVG/main" r:embed="rId4"/>
-              </a:ext>
-            </a:extLst>
-          </a:blip>
-          <a:stretch>
-            <a:fillRect/>
-          </a:stretch>
-        </p:blipFill>
-        <p:spPr>
-          <a:xfrm>
-            <a:off x="11498343" y="5262266"/>
-            <a:ext cx="180909" cy="180909"/>
-          </a:xfrm>
-          <a:prstGeom prst="rect">
-            <a:avLst/>
-          </a:prstGeom>
-        </p:spPr>
-      </p:pic>
       <p:sp>
         <p:nvSpPr>
           <p:cNvPr id="5" name="Text Placeholder 4">
@@ -12469,50 +12490,11 @@
           <a:p>
             <a:r>
               <a:rPr lang="en-US" dirty="0"/>
-              <a:t>+1 23 987 6554</a:t>
+              <a:t>DU Bootcamp 2020</a:t>
             </a:r>
           </a:p>
         </p:txBody>
       </p:sp>
-      <p:pic>
-        <p:nvPicPr>
-          <p:cNvPr id="10" name="Graphic 9" descr="Smart Phone" title="Icon - Presenter Phone Number">
-            <a:extLst>
-              <a:ext uri="{FF2B5EF4-FFF2-40B4-BE49-F238E27FC236}">
-                <a16:creationId xmlns:a16="http://schemas.microsoft.com/office/drawing/2014/main" id="{A29DE31C-E099-4579-BB03-675E0A40C5F2}"/>
-              </a:ext>
-            </a:extLst>
-          </p:cNvPr>
-          <p:cNvPicPr>
-            <a:picLocks noChangeAspect="1"/>
-          </p:cNvPicPr>
-          <p:nvPr/>
-        </p:nvPicPr>
-        <p:blipFill>
-          <a:blip r:embed="rId5" cstate="screen">
-            <a:extLst>
-              <a:ext uri="{28A0092B-C50C-407E-A947-70E740481C1C}">
-                <a14:useLocalDpi xmlns:a14="http://schemas.microsoft.com/office/drawing/2010/main"/>
-              </a:ext>
-              <a:ext uri="{96DAC541-7B7A-43D3-8B79-37D633B846F1}">
-                <asvg:svgBlip xmlns:asvg="http://schemas.microsoft.com/office/drawing/2016/SVG/main" r:embed="rId6"/>
-              </a:ext>
-            </a:extLst>
-          </a:blip>
-          <a:stretch>
-            <a:fillRect/>
-          </a:stretch>
-        </p:blipFill>
-        <p:spPr>
-          <a:xfrm>
-            <a:off x="11498343" y="5533246"/>
-            <a:ext cx="180909" cy="180909"/>
-          </a:xfrm>
-          <a:prstGeom prst="rect">
-            <a:avLst/>
-          </a:prstGeom>
-        </p:spPr>
-      </p:pic>
       <p:sp>
         <p:nvSpPr>
           <p:cNvPr id="6" name="Text Placeholder 5">
@@ -12536,7 +12518,7 @@
           <a:p>
             <a:r>
               <a:rPr lang="en-US" dirty="0"/>
-              <a:t>april@contoso.com</a:t>
+              <a:t>Instructor: Kevin Lee</a:t>
             </a:r>
           </a:p>
           <a:p>
@@ -12544,45 +12526,6 @@
           </a:p>
         </p:txBody>
       </p:sp>
-      <p:pic>
-        <p:nvPicPr>
-          <p:cNvPr id="9" name="Graphic 8" descr="Envelope" title="Icon Presenter Email">
-            <a:extLst>
-              <a:ext uri="{FF2B5EF4-FFF2-40B4-BE49-F238E27FC236}">
-                <a16:creationId xmlns:a16="http://schemas.microsoft.com/office/drawing/2014/main" id="{773C1382-ACE1-460F-A1B6-AB761A7D2E6B}"/>
-              </a:ext>
-            </a:extLst>
-          </p:cNvPr>
-          <p:cNvPicPr>
-            <a:picLocks noChangeAspect="1"/>
-          </p:cNvPicPr>
-          <p:nvPr/>
-        </p:nvPicPr>
-        <p:blipFill>
-          <a:blip r:embed="rId7" cstate="screen">
-            <a:extLst>
-              <a:ext uri="{28A0092B-C50C-407E-A947-70E740481C1C}">
-                <a14:useLocalDpi xmlns:a14="http://schemas.microsoft.com/office/drawing/2010/main"/>
-              </a:ext>
-              <a:ext uri="{96DAC541-7B7A-43D3-8B79-37D633B846F1}">
-                <asvg:svgBlip xmlns:asvg="http://schemas.microsoft.com/office/drawing/2016/SVG/main" r:embed="rId8"/>
-              </a:ext>
-            </a:extLst>
-          </a:blip>
-          <a:stretch>
-            <a:fillRect/>
-          </a:stretch>
-        </p:blipFill>
-        <p:spPr>
-          <a:xfrm>
-            <a:off x="11498343" y="5804226"/>
-            <a:ext cx="180909" cy="180909"/>
-          </a:xfrm>
-          <a:prstGeom prst="rect">
-            <a:avLst/>
-          </a:prstGeom>
-        </p:spPr>
-      </p:pic>
       <p:sp>
         <p:nvSpPr>
           <p:cNvPr id="16" name="Text Placeholder 15">
@@ -12606,186 +12549,10 @@
           <a:p>
             <a:r>
               <a:rPr lang="en-US" dirty="0"/>
-              <a:t>www.contoso.com</a:t>
-            </a:r>
-          </a:p>
-          <a:p>
-            <a:endParaRPr lang="en-US" dirty="0"/>
-          </a:p>
-        </p:txBody>
-      </p:sp>
-      <p:pic>
-        <p:nvPicPr>
-          <p:cNvPr id="11" name="Graphic 10" descr="Link">
-            <a:extLst>
-              <a:ext uri="{FF2B5EF4-FFF2-40B4-BE49-F238E27FC236}">
-                <a16:creationId xmlns:a16="http://schemas.microsoft.com/office/drawing/2014/main" id="{0718E6E0-05A2-479C-AEA8-1A385EB73474}"/>
-              </a:ext>
-            </a:extLst>
-          </p:cNvPr>
-          <p:cNvPicPr>
-            <a:picLocks noChangeAspect="1"/>
-          </p:cNvPicPr>
-          <p:nvPr/>
-        </p:nvPicPr>
-        <p:blipFill>
-          <a:blip r:embed="rId9" cstate="screen">
-            <a:extLst>
-              <a:ext uri="{28A0092B-C50C-407E-A947-70E740481C1C}">
-                <a14:useLocalDpi xmlns:a14="http://schemas.microsoft.com/office/drawing/2010/main"/>
-              </a:ext>
-              <a:ext uri="{96DAC541-7B7A-43D3-8B79-37D633B846F1}">
-                <asvg:svgBlip xmlns:asvg="http://schemas.microsoft.com/office/drawing/2016/SVG/main" r:embed="rId10"/>
-              </a:ext>
-            </a:extLst>
-          </a:blip>
-          <a:stretch>
-            <a:fillRect/>
-          </a:stretch>
-        </p:blipFill>
-        <p:spPr>
-          <a:xfrm>
-            <a:off x="11487646" y="6075206"/>
-            <a:ext cx="202303" cy="202303"/>
-          </a:xfrm>
-          <a:prstGeom prst="rect">
-            <a:avLst/>
-          </a:prstGeom>
-        </p:spPr>
-      </p:pic>
-    </p:spTree>
-    <p:extLst>
-      <p:ext uri="{BB962C8B-B14F-4D97-AF65-F5344CB8AC3E}">
-        <p14:creationId xmlns:p14="http://schemas.microsoft.com/office/powerpoint/2010/main" val="4153678306"/>
-      </p:ext>
-    </p:extLst>
-  </p:cSld>
-  <p:clrMapOvr>
-    <a:masterClrMapping/>
-  </p:clrMapOvr>
-</p:sld>
-</file>
-
-<file path=ppt/slides/slide11.xml><?xml version="1.0" encoding="utf-8"?>
-<p:sld xmlns:a="http://schemas.openxmlformats.org/drawingml/2006/main" xmlns:r="http://schemas.openxmlformats.org/officeDocument/2006/relationships" xmlns:p="http://schemas.openxmlformats.org/presentationml/2006/main">
-  <p:cSld>
-    <p:spTree>
-      <p:nvGrpSpPr>
-        <p:cNvPr id="1" name=""/>
-        <p:cNvGrpSpPr/>
-        <p:nvPr/>
-      </p:nvGrpSpPr>
-      <p:grpSpPr>
-        <a:xfrm>
-          <a:off x="0" y="0"/>
-          <a:ext cx="0" cy="0"/>
-          <a:chOff x="0" y="0"/>
-          <a:chExt cx="0" cy="0"/>
-        </a:xfrm>
-      </p:grpSpPr>
-      <p:sp>
-        <p:nvSpPr>
-          <p:cNvPr id="4" name="Title 3">
-            <a:extLst>
-              <a:ext uri="{FF2B5EF4-FFF2-40B4-BE49-F238E27FC236}">
-                <a16:creationId xmlns:a16="http://schemas.microsoft.com/office/drawing/2014/main" id="{E98DCA46-603B-4178-8707-30E192CE6B8D}"/>
-              </a:ext>
-            </a:extLst>
-          </p:cNvPr>
-          <p:cNvSpPr>
-            <a:spLocks noGrp="1"/>
-          </p:cNvSpPr>
-          <p:nvPr>
-            <p:ph type="title"/>
-          </p:nvPr>
-        </p:nvSpPr>
-        <p:spPr/>
-        <p:txBody>
-          <a:bodyPr/>
-          <a:lstStyle/>
-          <a:p>
-            <a:r>
-              <a:rPr lang="en-US" dirty="0"/>
-              <a:t>Customize this Template</a:t>
-            </a:r>
-          </a:p>
-        </p:txBody>
-      </p:sp>
-      <p:sp>
-        <p:nvSpPr>
-          <p:cNvPr id="3" name="Text Placeholder 2">
-            <a:extLst>
-              <a:ext uri="{FF2B5EF4-FFF2-40B4-BE49-F238E27FC236}">
-                <a16:creationId xmlns:a16="http://schemas.microsoft.com/office/drawing/2014/main" id="{D61A5CDF-4DF7-4A2B-9829-A1477B50A039}"/>
-              </a:ext>
-            </a:extLst>
-          </p:cNvPr>
-          <p:cNvSpPr>
-            <a:spLocks noGrp="1"/>
-          </p:cNvSpPr>
-          <p:nvPr>
-            <p:ph type="body" sz="quarter" idx="34"/>
-          </p:nvPr>
-        </p:nvSpPr>
-        <p:spPr/>
-        <p:txBody>
-          <a:bodyPr/>
-          <a:lstStyle/>
-          <a:p>
-            <a:pPr>
-              <a:lnSpc>
-                <a:spcPct val="100000"/>
-              </a:lnSpc>
-            </a:pPr>
-            <a:r>
-              <a:rPr lang="en-US" u="sng" dirty="0">
-                <a:solidFill>
-                  <a:srgbClr val="0070C0"/>
-                </a:solidFill>
-                <a:hlinkClick r:id="rId2">
-                  <a:extLst>
-                    <a:ext uri="{A12FA001-AC4F-418D-AE19-62706E023703}">
-                      <ahyp:hlinkClr xmlns:ahyp="http://schemas.microsoft.com/office/drawing/2018/hyperlinkcolor" val="tx"/>
-                    </a:ext>
-                  </a:extLst>
-                </a:hlinkClick>
-              </a:rPr>
-              <a:t>Template Editing Instructions and Feedback</a:t>
-            </a:r>
-            <a:endParaRPr lang="en-US" u="sng" dirty="0">
-              <a:solidFill>
-                <a:srgbClr val="0070C0"/>
-              </a:solidFill>
-            </a:endParaRPr>
-          </a:p>
-        </p:txBody>
-      </p:sp>
-      <p:sp>
-        <p:nvSpPr>
-          <p:cNvPr id="2" name="Slide Number Placeholder 1">
-            <a:extLst>
-              <a:ext uri="{FF2B5EF4-FFF2-40B4-BE49-F238E27FC236}">
-                <a16:creationId xmlns:a16="http://schemas.microsoft.com/office/drawing/2014/main" id="{28EF8F27-03BC-4080-83E5-6B49046A3122}"/>
-              </a:ext>
-            </a:extLst>
-          </p:cNvPr>
-          <p:cNvSpPr>
-            <a:spLocks noGrp="1"/>
-          </p:cNvSpPr>
-          <p:nvPr>
-            <p:ph type="sldNum" sz="quarter" idx="33"/>
-          </p:nvPr>
-        </p:nvSpPr>
-        <p:spPr/>
-        <p:txBody>
-          <a:bodyPr/>
-          <a:lstStyle/>
-          <a:p>
-            <a:fld id="{19B51A1E-902D-48AF-9020-955120F399B6}" type="slidenum">
-              <a:rPr lang="en-US" smtClean="0"/>
-              <a:pPr/>
-              <a:t>11</a:t>
-            </a:fld>
+              <a:t>TA’s: Jess Tillis and Royal Taylor</a:t>
+            </a:r>
+          </a:p>
+          <a:p>
             <a:endParaRPr lang="en-US" dirty="0"/>
           </a:p>
         </p:txBody>
@@ -12793,7 +12560,7 @@
     </p:spTree>
     <p:extLst>
       <p:ext uri="{BB962C8B-B14F-4D97-AF65-F5344CB8AC3E}">
-        <p14:creationId xmlns:p14="http://schemas.microsoft.com/office/powerpoint/2010/main" val="59582380"/>
+        <p14:creationId xmlns:p14="http://schemas.microsoft.com/office/powerpoint/2010/main" val="4153678306"/>
       </p:ext>
     </p:extLst>
   </p:cSld>
@@ -12844,8 +12611,8 @@
         </p:blipFill>
         <p:spPr>
           <a:xfrm>
-            <a:off x="146853" y="144000"/>
-            <a:ext cx="11899494" cy="6060155"/>
+            <a:off x="148506" y="170476"/>
+            <a:ext cx="11899494" cy="6587912"/>
           </a:xfrm>
         </p:spPr>
       </p:pic>
@@ -12865,15 +12632,17 @@
             <p:ph type="ctrTitle"/>
           </p:nvPr>
         </p:nvSpPr>
-        <p:spPr/>
+        <p:spPr>
+          <a:xfrm>
+            <a:off x="779101" y="804500"/>
+            <a:ext cx="3739634" cy="2533209"/>
+          </a:xfrm>
+        </p:spPr>
         <p:txBody>
           <a:bodyPr/>
           <a:lstStyle/>
           <a:p>
-            <a:r>
-              <a:rPr lang="en-US" dirty="0"/>
-              <a:t>Section Divider Option 1</a:t>
-            </a:r>
+            <a:endParaRPr lang="en-US" dirty="0"/>
           </a:p>
         </p:txBody>
       </p:sp>
@@ -12894,6 +12663,10 @@
           </p:nvPr>
         </p:nvSpPr>
         <p:spPr>
+          <a:xfrm>
+            <a:off x="4830702" y="353039"/>
+            <a:ext cx="2301776" cy="562177"/>
+          </a:xfrm>
           <a:ln w="3175">
             <a:gradFill>
               <a:gsLst>
@@ -12913,9 +12686,12 @@
           <a:bodyPr/>
           <a:lstStyle/>
           <a:p>
-            <a:r>
-              <a:rPr lang="en-US" dirty="0"/>
-              <a:t>Lorem ipsum dolor sit amet, consectetur adipiscing elit</a:t>
+            <a:pPr algn="ctr"/>
+            <a:r>
+              <a:rPr lang="en-US" sz="2800" dirty="0">
+                <a:latin typeface="+mj-lt"/>
+              </a:rPr>
+              <a:t>Data Used:</a:t>
             </a:r>
           </a:p>
         </p:txBody>
@@ -12950,6 +12726,180 @@
           </a:p>
         </p:txBody>
       </p:sp>
+      <p:pic>
+        <p:nvPicPr>
+          <p:cNvPr id="8" name="Picture 7" descr="A polar bear in the snow&#10;&#10;Description automatically generated">
+            <a:extLst>
+              <a:ext uri="{FF2B5EF4-FFF2-40B4-BE49-F238E27FC236}">
+                <a16:creationId xmlns:a16="http://schemas.microsoft.com/office/drawing/2014/main" id="{D10EB040-3BAD-49C7-AE13-43FB4F5D557B}"/>
+              </a:ext>
+            </a:extLst>
+          </p:cNvPr>
+          <p:cNvPicPr>
+            <a:picLocks noChangeAspect="1"/>
+          </p:cNvPicPr>
+          <p:nvPr/>
+        </p:nvPicPr>
+        <p:blipFill>
+          <a:blip r:embed="rId3">
+            <a:extLst>
+              <a:ext uri="{837473B0-CC2E-450A-ABE3-18F120FF3D39}">
+                <a1611:picAttrSrcUrl xmlns:a1611="http://schemas.microsoft.com/office/drawing/2016/11/main" r:id="rId4"/>
+              </a:ext>
+            </a:extLst>
+          </a:blip>
+          <a:stretch>
+            <a:fillRect/>
+          </a:stretch>
+        </p:blipFill>
+        <p:spPr>
+          <a:xfrm>
+            <a:off x="779099" y="777475"/>
+            <a:ext cx="3739635" cy="2560234"/>
+          </a:xfrm>
+          <a:prstGeom prst="rect">
+            <a:avLst/>
+          </a:prstGeom>
+        </p:spPr>
+      </p:pic>
+      <p:sp>
+        <p:nvSpPr>
+          <p:cNvPr id="10" name="TextBox 9">
+            <a:extLst>
+              <a:ext uri="{FF2B5EF4-FFF2-40B4-BE49-F238E27FC236}">
+                <a16:creationId xmlns:a16="http://schemas.microsoft.com/office/drawing/2014/main" id="{95846160-E3E2-4E0B-B120-1C1B72CE09B0}"/>
+              </a:ext>
+            </a:extLst>
+          </p:cNvPr>
+          <p:cNvSpPr txBox="1"/>
+          <p:nvPr/>
+        </p:nvSpPr>
+        <p:spPr>
+          <a:xfrm>
+            <a:off x="779099" y="3821834"/>
+            <a:ext cx="2990745" cy="230832"/>
+          </a:xfrm>
+          <a:prstGeom prst="rect">
+            <a:avLst/>
+          </a:prstGeom>
+          <a:noFill/>
+        </p:spPr>
+        <p:txBody>
+          <a:bodyPr wrap="square" rtlCol="0">
+            <a:spAutoFit/>
+          </a:bodyPr>
+          <a:lstStyle/>
+          <a:p>
+            <a:r>
+              <a:rPr lang="en-US" sz="900">
+                <a:hlinkClick r:id="rId4" tooltip="https://exceptionalanimals.wordpress.com/2011/03/20/polar-bear-ursus-maritimus/"/>
+              </a:rPr>
+              <a:t>This Photo</a:t>
+            </a:r>
+            <a:r>
+              <a:rPr lang="en-US" sz="900"/>
+              <a:t> by Unknown Author is licensed under </a:t>
+            </a:r>
+            <a:r>
+              <a:rPr lang="en-US" sz="900">
+                <a:hlinkClick r:id="rId5" tooltip="https://creativecommons.org/licenses/by-sa/3.0/"/>
+              </a:rPr>
+              <a:t>CC BY-SA</a:t>
+            </a:r>
+            <a:endParaRPr lang="en-US" sz="900"/>
+          </a:p>
+        </p:txBody>
+      </p:sp>
+      <p:pic>
+        <p:nvPicPr>
+          <p:cNvPr id="12" name="Picture 11" descr="Graphical user interface, text, application&#10;&#10;Description automatically generated">
+            <a:extLst>
+              <a:ext uri="{FF2B5EF4-FFF2-40B4-BE49-F238E27FC236}">
+                <a16:creationId xmlns:a16="http://schemas.microsoft.com/office/drawing/2014/main" id="{DFB67DC3-A6D4-45DE-A314-1151B29BFDE0}"/>
+              </a:ext>
+            </a:extLst>
+          </p:cNvPr>
+          <p:cNvPicPr>
+            <a:picLocks noChangeAspect="1"/>
+          </p:cNvPicPr>
+          <p:nvPr/>
+        </p:nvPicPr>
+        <p:blipFill>
+          <a:blip r:embed="rId6"/>
+          <a:stretch>
+            <a:fillRect/>
+          </a:stretch>
+        </p:blipFill>
+        <p:spPr>
+          <a:xfrm>
+            <a:off x="2549087" y="4337794"/>
+            <a:ext cx="8863813" cy="2167167"/>
+          </a:xfrm>
+          <a:prstGeom prst="rect">
+            <a:avLst/>
+          </a:prstGeom>
+        </p:spPr>
+      </p:pic>
+      <p:pic>
+        <p:nvPicPr>
+          <p:cNvPr id="6" name="Picture 5" descr="Graphical user interface, text, application&#10;&#10;Description automatically generated">
+            <a:extLst>
+              <a:ext uri="{FF2B5EF4-FFF2-40B4-BE49-F238E27FC236}">
+                <a16:creationId xmlns:a16="http://schemas.microsoft.com/office/drawing/2014/main" id="{6906707B-5159-40A2-A084-2073CDC0FC46}"/>
+              </a:ext>
+            </a:extLst>
+          </p:cNvPr>
+          <p:cNvPicPr>
+            <a:picLocks noChangeAspect="1"/>
+          </p:cNvPicPr>
+          <p:nvPr/>
+        </p:nvPicPr>
+        <p:blipFill>
+          <a:blip r:embed="rId7"/>
+          <a:stretch>
+            <a:fillRect/>
+          </a:stretch>
+        </p:blipFill>
+        <p:spPr>
+          <a:xfrm>
+            <a:off x="7477888" y="3916765"/>
+            <a:ext cx="4199537" cy="1809940"/>
+          </a:xfrm>
+          <a:prstGeom prst="rect">
+            <a:avLst/>
+          </a:prstGeom>
+        </p:spPr>
+      </p:pic>
+      <p:pic>
+        <p:nvPicPr>
+          <p:cNvPr id="14" name="Picture 13" descr="Table&#10;&#10;Description automatically generated">
+            <a:extLst>
+              <a:ext uri="{FF2B5EF4-FFF2-40B4-BE49-F238E27FC236}">
+                <a16:creationId xmlns:a16="http://schemas.microsoft.com/office/drawing/2014/main" id="{C6D67991-6504-4951-B42A-AE1391A1B184}"/>
+              </a:ext>
+            </a:extLst>
+          </p:cNvPr>
+          <p:cNvPicPr>
+            <a:picLocks noChangeAspect="1"/>
+          </p:cNvPicPr>
+          <p:nvPr/>
+        </p:nvPicPr>
+        <p:blipFill>
+          <a:blip r:embed="rId8"/>
+          <a:stretch>
+            <a:fillRect/>
+          </a:stretch>
+        </p:blipFill>
+        <p:spPr>
+          <a:xfrm>
+            <a:off x="6762376" y="1097412"/>
+            <a:ext cx="5281118" cy="2149026"/>
+          </a:xfrm>
+          <a:prstGeom prst="rect">
+            <a:avLst/>
+          </a:prstGeom>
+        </p:spPr>
+      </p:pic>
     </p:spTree>
     <p:extLst>
       <p:ext uri="{BB962C8B-B14F-4D97-AF65-F5344CB8AC3E}">
@@ -13157,7 +13107,7 @@
         <p:spPr>
           <a:xfrm>
             <a:off x="6771584" y="144000"/>
-            <a:ext cx="5275131" cy="6048000"/>
+            <a:ext cx="5275131" cy="6543524"/>
           </a:xfrm>
         </p:spPr>
       </p:pic>
@@ -17751,8 +17701,8 @@
         </p:blipFill>
         <p:spPr>
           <a:xfrm>
-            <a:off x="146743" y="143999"/>
-            <a:ext cx="11899714" cy="6047999"/>
+            <a:off x="148286" y="170476"/>
+            <a:ext cx="11899714" cy="6543525"/>
           </a:xfrm>
         </p:spPr>
       </p:pic>
@@ -17773,6 +17723,10 @@
           </p:nvPr>
         </p:nvSpPr>
         <p:spPr>
+          <a:xfrm>
+            <a:off x="389692" y="471617"/>
+            <a:ext cx="4101900" cy="773546"/>
+          </a:xfrm>
           <a:solidFill>
             <a:schemeClr val="tx1"/>
           </a:solidFill>
@@ -17782,8 +17736,8 @@
           <a:lstStyle/>
           <a:p>
             <a:r>
-              <a:rPr lang="en-US" dirty="0"/>
-              <a:t>Lorem ipsum dolor sit amet, consectetur adipiscing elit. </a:t>
+              <a:rPr lang="en-US" sz="3200" dirty="0"/>
+              <a:t>Target Audiences:</a:t>
             </a:r>
           </a:p>
         </p:txBody>
@@ -17846,6 +17800,66 @@
           </a:p>
         </p:txBody>
       </p:sp>
+      <p:pic>
+        <p:nvPicPr>
+          <p:cNvPr id="3" name="Picture 2" descr="A picture containing website&#10;&#10;Description automatically generated">
+            <a:extLst>
+              <a:ext uri="{FF2B5EF4-FFF2-40B4-BE49-F238E27FC236}">
+                <a16:creationId xmlns:a16="http://schemas.microsoft.com/office/drawing/2014/main" id="{EA2344F4-3318-4AC4-A800-9C8B4B2858EE}"/>
+              </a:ext>
+            </a:extLst>
+          </p:cNvPr>
+          <p:cNvPicPr>
+            <a:picLocks noChangeAspect="1"/>
+          </p:cNvPicPr>
+          <p:nvPr/>
+        </p:nvPicPr>
+        <p:blipFill>
+          <a:blip r:embed="rId3"/>
+          <a:stretch>
+            <a:fillRect/>
+          </a:stretch>
+        </p:blipFill>
+        <p:spPr>
+          <a:xfrm>
+            <a:off x="3357709" y="1413139"/>
+            <a:ext cx="3611262" cy="3852014"/>
+          </a:xfrm>
+          <a:prstGeom prst="rect">
+            <a:avLst/>
+          </a:prstGeom>
+        </p:spPr>
+      </p:pic>
+      <p:pic>
+        <p:nvPicPr>
+          <p:cNvPr id="7" name="Picture 6" descr="A picture containing photo, birthday, cake, riding&#10;&#10;Description automatically generated">
+            <a:extLst>
+              <a:ext uri="{FF2B5EF4-FFF2-40B4-BE49-F238E27FC236}">
+                <a16:creationId xmlns:a16="http://schemas.microsoft.com/office/drawing/2014/main" id="{AE830B57-0DC2-470C-8486-F3D88F2BF7B8}"/>
+              </a:ext>
+            </a:extLst>
+          </p:cNvPr>
+          <p:cNvPicPr>
+            <a:picLocks noChangeAspect="1"/>
+          </p:cNvPicPr>
+          <p:nvPr/>
+        </p:nvPicPr>
+        <p:blipFill>
+          <a:blip r:embed="rId4"/>
+          <a:stretch>
+            <a:fillRect/>
+          </a:stretch>
+        </p:blipFill>
+        <p:spPr>
+          <a:xfrm>
+            <a:off x="7568363" y="471617"/>
+            <a:ext cx="2969431" cy="3983058"/>
+          </a:xfrm>
+          <a:prstGeom prst="rect">
+            <a:avLst/>
+          </a:prstGeom>
+        </p:spPr>
+      </p:pic>
     </p:spTree>
     <p:extLst>
       <p:ext uri="{BB962C8B-B14F-4D97-AF65-F5344CB8AC3E}">
@@ -18711,6 +18725,14 @@
 </file>
 
 <file path=customXml/item2.xml><?xml version="1.0" encoding="utf-8"?>
+<p:properties xmlns:p="http://schemas.microsoft.com/office/2006/metadata/properties" xmlns:xsi="http://www.w3.org/2001/XMLSchema-instance" xmlns:pc="http://schemas.microsoft.com/office/infopath/2007/PartnerControls">
+  <documentManagement>
+    <MediaServiceKeyPoints xmlns="71af3243-3dd4-4a8d-8c0d-dd76da1f02a5" xsi:nil="true"/>
+  </documentManagement>
+</p:properties>
+</file>
+
+<file path=customXml/item3.xml><?xml version="1.0" encoding="utf-8"?>
 <ct:contentTypeSchema xmlns:ct="http://schemas.microsoft.com/office/2006/metadata/contentType" xmlns:ma="http://schemas.microsoft.com/office/2006/metadata/properties/metaAttributes" ct:_="" ma:_="" ma:contentTypeName="Document" ma:contentTypeID="0x01010079F111ED35F8CC479449609E8A0923A6" ma:contentTypeVersion="11" ma:contentTypeDescription="Create a new document." ma:contentTypeScope="" ma:versionID="96291512c1ee715ab617f4c07df79fc1">
   <xsd:schema xmlns:xsd="http://www.w3.org/2001/XMLSchema" xmlns:xs="http://www.w3.org/2001/XMLSchema" xmlns:p="http://schemas.microsoft.com/office/2006/metadata/properties" xmlns:ns2="71af3243-3dd4-4a8d-8c0d-dd76da1f02a5" xmlns:ns3="16c05727-aa75-4e4a-9b5f-8a80a1165891" targetNamespace="http://schemas.microsoft.com/office/2006/metadata/properties" ma:root="true" ma:fieldsID="8256c27c40ca5c40ce1cf6c44f0205df" ns2:_="" ns3:_="">
     <xsd:import namespace="71af3243-3dd4-4a8d-8c0d-dd76da1f02a5"/>
@@ -18921,14 +18943,6 @@
 </ct:contentTypeSchema>
 </file>
 
-<file path=customXml/item3.xml><?xml version="1.0" encoding="utf-8"?>
-<p:properties xmlns:p="http://schemas.microsoft.com/office/2006/metadata/properties" xmlns:xsi="http://www.w3.org/2001/XMLSchema-instance" xmlns:pc="http://schemas.microsoft.com/office/infopath/2007/PartnerControls">
-  <documentManagement>
-    <MediaServiceKeyPoints xmlns="71af3243-3dd4-4a8d-8c0d-dd76da1f02a5" xsi:nil="true"/>
-  </documentManagement>
-</p:properties>
-</file>
-
 <file path=customXml/itemProps1.xml><?xml version="1.0" encoding="utf-8"?>
 <ds:datastoreItem xmlns:ds="http://schemas.openxmlformats.org/officeDocument/2006/customXml" ds:itemID="{8D349276-D03C-4504-A5DA-3C2BED60D320}">
   <ds:schemaRefs>
@@ -18938,6 +18952,16 @@
 </file>
 
 <file path=customXml/itemProps2.xml><?xml version="1.0" encoding="utf-8"?>
+<ds:datastoreItem xmlns:ds="http://schemas.openxmlformats.org/officeDocument/2006/customXml" ds:itemID="{04A1A72F-8D9B-43C2-9EF9-F1EF7B91BE5A}">
+  <ds:schemaRefs>
+    <ds:schemaRef ds:uri="http://schemas.microsoft.com/office/2006/metadata/properties"/>
+    <ds:schemaRef ds:uri="http://schemas.microsoft.com/office/infopath/2007/PartnerControls"/>
+    <ds:schemaRef ds:uri="71af3243-3dd4-4a8d-8c0d-dd76da1f02a5"/>
+  </ds:schemaRefs>
+</ds:datastoreItem>
+</file>
+
+<file path=customXml/itemProps3.xml><?xml version="1.0" encoding="utf-8"?>
 <ds:datastoreItem xmlns:ds="http://schemas.openxmlformats.org/officeDocument/2006/customXml" ds:itemID="{F4597FF3-20AC-4CC1-81BE-167C9DD71F88}">
   <ds:schemaRefs>
     <ds:schemaRef ds:uri="http://schemas.microsoft.com/office/2006/metadata/contentType"/>
@@ -18954,14 +18978,4 @@
     <ds:schemaRef ds:uri="http://schemas.microsoft.com/internal/obd"/>
   </ds:schemaRefs>
 </ds:datastoreItem>
-</file>
-
-<file path=customXml/itemProps3.xml><?xml version="1.0" encoding="utf-8"?>
-<ds:datastoreItem xmlns:ds="http://schemas.openxmlformats.org/officeDocument/2006/customXml" ds:itemID="{04A1A72F-8D9B-43C2-9EF9-F1EF7B91BE5A}">
-  <ds:schemaRefs>
-    <ds:schemaRef ds:uri="http://schemas.microsoft.com/office/2006/metadata/properties"/>
-    <ds:schemaRef ds:uri="http://schemas.microsoft.com/office/infopath/2007/PartnerControls"/>
-    <ds:schemaRef ds:uri="71af3243-3dd4-4a8d-8c0d-dd76da1f02a5"/>
-  </ds:schemaRefs>
-</ds:datastoreItem>
 </file>
</xml_diff>